<commit_message>
Navbar  - flat class removed bg-color: transparent  - added class transparent
sermons.html
 - latest and recent sermon now takes up remaining space (added xl-6-5 and xl-3-5 classes)
 - latest sermon ribbon placement moved to top of overlay
 - ribbon-icons changed to appropriate icons

events.html
 - changed to new layout

style.css
 - ribbon made a bit smaller
 - max-width-md made larger
 - added Dialog Box for events.html
 - xl-6-5 (44.44%)

script.js - fixed navbar class

added new event-image (caroling)
 - xl-3-5 (27.77%)
</commit_message>
<xml_diff>
--- a/img/ppt/event-images.pptx
+++ b/img/ppt/event-images.pptx
@@ -8,8 +8,9 @@
     <p:sldId id="256" r:id="rId2"/>
     <p:sldId id="258" r:id="rId3"/>
     <p:sldId id="259" r:id="rId4"/>
-    <p:sldId id="260" r:id="rId5"/>
-    <p:sldId id="261" r:id="rId6"/>
+    <p:sldId id="261" r:id="rId5"/>
+    <p:sldId id="262" r:id="rId6"/>
+    <p:sldId id="260" r:id="rId7"/>
   </p:sldIdLst>
   <p:sldSz cx="12192000" cy="6858000"/>
   <p:notesSz cx="6858000" cy="9144000"/>
@@ -247,7 +248,7 @@
           <a:p>
             <a:fld id="{8F1CCE99-546E-42A4-8D69-179D7C9CE33A}" type="datetimeFigureOut">
               <a:rPr lang="en-US" smtClean="0"/>
-              <a:t>11/7/2017</a:t>
+              <a:t>12/29/2017</a:t>
             </a:fld>
             <a:endParaRPr lang="en-US"/>
           </a:p>
@@ -417,7 +418,7 @@
           <a:p>
             <a:fld id="{8F1CCE99-546E-42A4-8D69-179D7C9CE33A}" type="datetimeFigureOut">
               <a:rPr lang="en-US" smtClean="0"/>
-              <a:t>11/7/2017</a:t>
+              <a:t>12/29/2017</a:t>
             </a:fld>
             <a:endParaRPr lang="en-US"/>
           </a:p>
@@ -597,7 +598,7 @@
           <a:p>
             <a:fld id="{8F1CCE99-546E-42A4-8D69-179D7C9CE33A}" type="datetimeFigureOut">
               <a:rPr lang="en-US" smtClean="0"/>
-              <a:t>11/7/2017</a:t>
+              <a:t>12/29/2017</a:t>
             </a:fld>
             <a:endParaRPr lang="en-US"/>
           </a:p>
@@ -767,7 +768,7 @@
           <a:p>
             <a:fld id="{8F1CCE99-546E-42A4-8D69-179D7C9CE33A}" type="datetimeFigureOut">
               <a:rPr lang="en-US" smtClean="0"/>
-              <a:t>11/7/2017</a:t>
+              <a:t>12/29/2017</a:t>
             </a:fld>
             <a:endParaRPr lang="en-US"/>
           </a:p>
@@ -1013,7 +1014,7 @@
           <a:p>
             <a:fld id="{8F1CCE99-546E-42A4-8D69-179D7C9CE33A}" type="datetimeFigureOut">
               <a:rPr lang="en-US" smtClean="0"/>
-              <a:t>11/7/2017</a:t>
+              <a:t>12/29/2017</a:t>
             </a:fld>
             <a:endParaRPr lang="en-US"/>
           </a:p>
@@ -1245,7 +1246,7 @@
           <a:p>
             <a:fld id="{8F1CCE99-546E-42A4-8D69-179D7C9CE33A}" type="datetimeFigureOut">
               <a:rPr lang="en-US" smtClean="0"/>
-              <a:t>11/7/2017</a:t>
+              <a:t>12/29/2017</a:t>
             </a:fld>
             <a:endParaRPr lang="en-US"/>
           </a:p>
@@ -1612,7 +1613,7 @@
           <a:p>
             <a:fld id="{8F1CCE99-546E-42A4-8D69-179D7C9CE33A}" type="datetimeFigureOut">
               <a:rPr lang="en-US" smtClean="0"/>
-              <a:t>11/7/2017</a:t>
+              <a:t>12/29/2017</a:t>
             </a:fld>
             <a:endParaRPr lang="en-US"/>
           </a:p>
@@ -1730,7 +1731,7 @@
           <a:p>
             <a:fld id="{8F1CCE99-546E-42A4-8D69-179D7C9CE33A}" type="datetimeFigureOut">
               <a:rPr lang="en-US" smtClean="0"/>
-              <a:t>11/7/2017</a:t>
+              <a:t>12/29/2017</a:t>
             </a:fld>
             <a:endParaRPr lang="en-US"/>
           </a:p>
@@ -1825,7 +1826,7 @@
           <a:p>
             <a:fld id="{8F1CCE99-546E-42A4-8D69-179D7C9CE33A}" type="datetimeFigureOut">
               <a:rPr lang="en-US" smtClean="0"/>
-              <a:t>11/7/2017</a:t>
+              <a:t>12/29/2017</a:t>
             </a:fld>
             <a:endParaRPr lang="en-US"/>
           </a:p>
@@ -2102,7 +2103,7 @@
           <a:p>
             <a:fld id="{8F1CCE99-546E-42A4-8D69-179D7C9CE33A}" type="datetimeFigureOut">
               <a:rPr lang="en-US" smtClean="0"/>
-              <a:t>11/7/2017</a:t>
+              <a:t>12/29/2017</a:t>
             </a:fld>
             <a:endParaRPr lang="en-US"/>
           </a:p>
@@ -2355,7 +2356,7 @@
           <a:p>
             <a:fld id="{8F1CCE99-546E-42A4-8D69-179D7C9CE33A}" type="datetimeFigureOut">
               <a:rPr lang="en-US" smtClean="0"/>
-              <a:t>11/7/2017</a:t>
+              <a:t>12/29/2017</a:t>
             </a:fld>
             <a:endParaRPr lang="en-US"/>
           </a:p>
@@ -2568,7 +2569,7 @@
           <a:p>
             <a:fld id="{8F1CCE99-546E-42A4-8D69-179D7C9CE33A}" type="datetimeFigureOut">
               <a:rPr lang="en-US" smtClean="0"/>
-              <a:t>11/7/2017</a:t>
+              <a:t>12/29/2017</a:t>
             </a:fld>
             <a:endParaRPr lang="en-US"/>
           </a:p>
@@ -3187,17 +3188,7 @@
                 <a:latin typeface="Roboto" panose="02000000000000000000" pitchFamily="2" charset="0"/>
                 <a:ea typeface="Roboto" panose="02000000000000000000" pitchFamily="2" charset="0"/>
               </a:rPr>
-              <a:t>Adult Bibl</a:t>
-            </a:r>
-            <a:r>
-              <a:rPr lang="en-US" cap="small" dirty="0" smtClean="0">
-                <a:solidFill>
-                  <a:schemeClr val="bg1"/>
-                </a:solidFill>
-                <a:latin typeface="Roboto" panose="02000000000000000000" pitchFamily="2" charset="0"/>
-                <a:ea typeface="Roboto" panose="02000000000000000000" pitchFamily="2" charset="0"/>
-              </a:rPr>
-              <a:t>e Class (ABC)</a:t>
+              <a:t>Adult Bible Class (ABC)</a:t>
             </a:r>
             <a:endParaRPr lang="en-US" cap="small" dirty="0">
               <a:solidFill>
@@ -3700,7 +3691,7 @@
           </a:blip>
           <a:srcRect/>
           <a:stretch>
-            <a:fillRect t="-9000" b="-9000"/>
+            <a:fillRect t="-83000" b="-83000"/>
           </a:stretch>
         </a:blipFill>
         <a:effectLst/>
@@ -3788,15 +3779,22 @@
           <a:lstStyle/>
           <a:p>
             <a:r>
-              <a:rPr lang="en-US" cap="small" dirty="0">
+              <a:rPr lang="en-US" cap="small" dirty="0" smtClean="0">
                 <a:solidFill>
                   <a:schemeClr val="bg1"/>
                 </a:solidFill>
                 <a:latin typeface="Roboto" panose="02000000000000000000" pitchFamily="2" charset="0"/>
                 <a:ea typeface="Roboto" panose="02000000000000000000" pitchFamily="2" charset="0"/>
               </a:rPr>
-              <a:t>Candlelight Service</a:t>
-            </a:r>
+              <a:t>Prayer Items</a:t>
+            </a:r>
+            <a:endParaRPr lang="en-US" cap="small" dirty="0">
+              <a:solidFill>
+                <a:schemeClr val="bg1"/>
+              </a:solidFill>
+              <a:latin typeface="Roboto" panose="02000000000000000000" pitchFamily="2" charset="0"/>
+              <a:ea typeface="Roboto" panose="02000000000000000000" pitchFamily="2" charset="0"/>
+            </a:endParaRPr>
           </a:p>
         </p:txBody>
       </p:sp>
@@ -3815,19 +3813,6 @@
           <a:bodyPr/>
           <a:lstStyle/>
           <a:p>
-            <a:r>
-              <a:rPr lang="en-US" dirty="0" smtClean="0">
-                <a:solidFill>
-                  <a:schemeClr val="accent4">
-                    <a:lumMod val="60000"/>
-                    <a:lumOff val="40000"/>
-                  </a:schemeClr>
-                </a:solidFill>
-                <a:latin typeface="Roboto" panose="02000000000000000000" pitchFamily="2" charset="0"/>
-                <a:ea typeface="Roboto" panose="02000000000000000000" pitchFamily="2" charset="0"/>
-              </a:rPr>
-              <a:t>December 22, 2017</a:t>
-            </a:r>
             <a:endParaRPr lang="en-US" dirty="0">
               <a:solidFill>
                 <a:schemeClr val="accent4">
@@ -3844,7 +3829,7 @@
     </p:spTree>
     <p:extLst>
       <p:ext uri="{BB962C8B-B14F-4D97-AF65-F5344CB8AC3E}">
-        <p14:creationId xmlns:p14="http://schemas.microsoft.com/office/powerpoint/2010/main" val="1658497565"/>
+        <p14:creationId xmlns:p14="http://schemas.microsoft.com/office/powerpoint/2010/main" val="1472614531"/>
       </p:ext>
     </p:extLst>
   </p:cSld>
@@ -3872,7 +3857,7 @@
           </a:blip>
           <a:srcRect/>
           <a:stretch>
-            <a:fillRect t="-83000" b="-83000"/>
+            <a:fillRect t="-9000" b="-9000"/>
           </a:stretch>
         </a:blipFill>
         <a:effectLst/>
@@ -3967,7 +3952,7 @@
                 <a:latin typeface="Roboto" panose="02000000000000000000" pitchFamily="2" charset="0"/>
                 <a:ea typeface="Roboto" panose="02000000000000000000" pitchFamily="2" charset="0"/>
               </a:rPr>
-              <a:t>Prayer Items</a:t>
+              <a:t>Christmas Caroling</a:t>
             </a:r>
             <a:endParaRPr lang="en-US" cap="small" dirty="0">
               <a:solidFill>
@@ -4010,7 +3995,179 @@
     </p:spTree>
     <p:extLst>
       <p:ext uri="{BB962C8B-B14F-4D97-AF65-F5344CB8AC3E}">
-        <p14:creationId xmlns:p14="http://schemas.microsoft.com/office/powerpoint/2010/main" val="1472614531"/>
+        <p14:creationId xmlns:p14="http://schemas.microsoft.com/office/powerpoint/2010/main" val="2727521991"/>
+      </p:ext>
+    </p:extLst>
+  </p:cSld>
+  <p:clrMapOvr>
+    <a:masterClrMapping/>
+  </p:clrMapOvr>
+  <p:timing>
+    <p:tnLst>
+      <p:par>
+        <p:cTn id="1" dur="indefinite" restart="never" nodeType="tmRoot"/>
+      </p:par>
+    </p:tnLst>
+  </p:timing>
+</p:sld>
+</file>
+
+<file path=ppt/slides/slide6.xml><?xml version="1.0" encoding="utf-8"?>
+<p:sld xmlns:a="http://schemas.openxmlformats.org/drawingml/2006/main" xmlns:r="http://schemas.openxmlformats.org/officeDocument/2006/relationships" xmlns:p="http://schemas.openxmlformats.org/presentationml/2006/main">
+  <p:cSld>
+    <p:bg>
+      <p:bgPr>
+        <a:blipFill dpi="0" rotWithShape="1">
+          <a:blip r:embed="rId2">
+            <a:lum/>
+          </a:blip>
+          <a:srcRect/>
+          <a:stretch>
+            <a:fillRect t="-9000" b="-9000"/>
+          </a:stretch>
+        </a:blipFill>
+        <a:effectLst/>
+      </p:bgPr>
+    </p:bg>
+    <p:spTree>
+      <p:nvGrpSpPr>
+        <p:cNvPr id="1" name=""/>
+        <p:cNvGrpSpPr/>
+        <p:nvPr/>
+      </p:nvGrpSpPr>
+      <p:grpSpPr>
+        <a:xfrm>
+          <a:off x="0" y="0"/>
+          <a:ext cx="0" cy="0"/>
+          <a:chOff x="0" y="0"/>
+          <a:chExt cx="0" cy="0"/>
+        </a:xfrm>
+      </p:grpSpPr>
+      <p:sp>
+        <p:nvSpPr>
+          <p:cNvPr id="4" name="Rectangle 3"/>
+          <p:cNvSpPr/>
+          <p:nvPr/>
+        </p:nvSpPr>
+        <p:spPr>
+          <a:xfrm>
+            <a:off x="0" y="0"/>
+            <a:ext cx="12192000" cy="6858000"/>
+          </a:xfrm>
+          <a:prstGeom prst="rect">
+            <a:avLst/>
+          </a:prstGeom>
+          <a:solidFill>
+            <a:schemeClr val="tx1">
+              <a:alpha val="20000"/>
+            </a:schemeClr>
+          </a:solidFill>
+          <a:ln>
+            <a:noFill/>
+          </a:ln>
+        </p:spPr>
+        <p:style>
+          <a:lnRef idx="2">
+            <a:schemeClr val="accent1">
+              <a:shade val="50000"/>
+            </a:schemeClr>
+          </a:lnRef>
+          <a:fillRef idx="1">
+            <a:schemeClr val="accent1"/>
+          </a:fillRef>
+          <a:effectRef idx="0">
+            <a:schemeClr val="accent1"/>
+          </a:effectRef>
+          <a:fontRef idx="minor">
+            <a:schemeClr val="lt1"/>
+          </a:fontRef>
+        </p:style>
+        <p:txBody>
+          <a:bodyPr rtlCol="0" anchor="ctr"/>
+          <a:lstStyle/>
+          <a:p>
+            <a:pPr algn="ctr"/>
+            <a:endParaRPr lang="en-US">
+              <a:solidFill>
+                <a:prstClr val="white"/>
+              </a:solidFill>
+            </a:endParaRPr>
+          </a:p>
+        </p:txBody>
+      </p:sp>
+      <p:sp>
+        <p:nvSpPr>
+          <p:cNvPr id="2" name="Title 1"/>
+          <p:cNvSpPr>
+            <a:spLocks noGrp="1"/>
+          </p:cNvSpPr>
+          <p:nvPr>
+            <p:ph type="ctrTitle"/>
+          </p:nvPr>
+        </p:nvSpPr>
+        <p:spPr/>
+        <p:txBody>
+          <a:bodyPr/>
+          <a:lstStyle/>
+          <a:p>
+            <a:r>
+              <a:rPr lang="en-US" cap="small" dirty="0">
+                <a:solidFill>
+                  <a:schemeClr val="bg1"/>
+                </a:solidFill>
+                <a:latin typeface="Roboto" panose="02000000000000000000" pitchFamily="2" charset="0"/>
+                <a:ea typeface="Roboto" panose="02000000000000000000" pitchFamily="2" charset="0"/>
+              </a:rPr>
+              <a:t>Candlelight Service</a:t>
+            </a:r>
+          </a:p>
+        </p:txBody>
+      </p:sp>
+      <p:sp>
+        <p:nvSpPr>
+          <p:cNvPr id="3" name="Subtitle 2"/>
+          <p:cNvSpPr>
+            <a:spLocks noGrp="1"/>
+          </p:cNvSpPr>
+          <p:nvPr>
+            <p:ph type="subTitle" idx="1"/>
+          </p:nvPr>
+        </p:nvSpPr>
+        <p:spPr/>
+        <p:txBody>
+          <a:bodyPr/>
+          <a:lstStyle/>
+          <a:p>
+            <a:r>
+              <a:rPr lang="en-US" dirty="0" smtClean="0">
+                <a:solidFill>
+                  <a:schemeClr val="accent4">
+                    <a:lumMod val="60000"/>
+                    <a:lumOff val="40000"/>
+                  </a:schemeClr>
+                </a:solidFill>
+                <a:latin typeface="Roboto" panose="02000000000000000000" pitchFamily="2" charset="0"/>
+                <a:ea typeface="Roboto" panose="02000000000000000000" pitchFamily="2" charset="0"/>
+              </a:rPr>
+              <a:t>December 22, 2017</a:t>
+            </a:r>
+            <a:endParaRPr lang="en-US" dirty="0">
+              <a:solidFill>
+                <a:schemeClr val="accent4">
+                  <a:lumMod val="60000"/>
+                  <a:lumOff val="40000"/>
+                </a:schemeClr>
+              </a:solidFill>
+              <a:latin typeface="Roboto" panose="02000000000000000000" pitchFamily="2" charset="0"/>
+              <a:ea typeface="Roboto" panose="02000000000000000000" pitchFamily="2" charset="0"/>
+            </a:endParaRPr>
+          </a:p>
+        </p:txBody>
+      </p:sp>
+    </p:spTree>
+    <p:extLst>
+      <p:ext uri="{BB962C8B-B14F-4D97-AF65-F5344CB8AC3E}">
+        <p14:creationId xmlns:p14="http://schemas.microsoft.com/office/powerpoint/2010/main" val="1658497565"/>
       </p:ext>
     </p:extLst>
   </p:cSld>

</xml_diff>

<commit_message>
new layout for events page
added card-reveal
added card-content.overflow-control
added series-on-revelations.jpg
added series-on-job.jpg
</commit_message>
<xml_diff>
--- a/img/ppt/event-images.pptx
+++ b/img/ppt/event-images.pptx
@@ -11,6 +11,8 @@
     <p:sldId id="261" r:id="rId5"/>
     <p:sldId id="262" r:id="rId6"/>
     <p:sldId id="260" r:id="rId7"/>
+    <p:sldId id="263" r:id="rId8"/>
+    <p:sldId id="264" r:id="rId9"/>
   </p:sldIdLst>
   <p:sldSz cx="12192000" cy="6858000"/>
   <p:notesSz cx="6858000" cy="9144000"/>
@@ -248,7 +250,7 @@
           <a:p>
             <a:fld id="{8F1CCE99-546E-42A4-8D69-179D7C9CE33A}" type="datetimeFigureOut">
               <a:rPr lang="en-US" smtClean="0"/>
-              <a:t>12/29/2017</a:t>
+              <a:t>5/2/2018</a:t>
             </a:fld>
             <a:endParaRPr lang="en-US"/>
           </a:p>
@@ -418,7 +420,7 @@
           <a:p>
             <a:fld id="{8F1CCE99-546E-42A4-8D69-179D7C9CE33A}" type="datetimeFigureOut">
               <a:rPr lang="en-US" smtClean="0"/>
-              <a:t>12/29/2017</a:t>
+              <a:t>5/2/2018</a:t>
             </a:fld>
             <a:endParaRPr lang="en-US"/>
           </a:p>
@@ -598,7 +600,7 @@
           <a:p>
             <a:fld id="{8F1CCE99-546E-42A4-8D69-179D7C9CE33A}" type="datetimeFigureOut">
               <a:rPr lang="en-US" smtClean="0"/>
-              <a:t>12/29/2017</a:t>
+              <a:t>5/2/2018</a:t>
             </a:fld>
             <a:endParaRPr lang="en-US"/>
           </a:p>
@@ -768,7 +770,7 @@
           <a:p>
             <a:fld id="{8F1CCE99-546E-42A4-8D69-179D7C9CE33A}" type="datetimeFigureOut">
               <a:rPr lang="en-US" smtClean="0"/>
-              <a:t>12/29/2017</a:t>
+              <a:t>5/2/2018</a:t>
             </a:fld>
             <a:endParaRPr lang="en-US"/>
           </a:p>
@@ -1014,7 +1016,7 @@
           <a:p>
             <a:fld id="{8F1CCE99-546E-42A4-8D69-179D7C9CE33A}" type="datetimeFigureOut">
               <a:rPr lang="en-US" smtClean="0"/>
-              <a:t>12/29/2017</a:t>
+              <a:t>5/2/2018</a:t>
             </a:fld>
             <a:endParaRPr lang="en-US"/>
           </a:p>
@@ -1246,7 +1248,7 @@
           <a:p>
             <a:fld id="{8F1CCE99-546E-42A4-8D69-179D7C9CE33A}" type="datetimeFigureOut">
               <a:rPr lang="en-US" smtClean="0"/>
-              <a:t>12/29/2017</a:t>
+              <a:t>5/2/2018</a:t>
             </a:fld>
             <a:endParaRPr lang="en-US"/>
           </a:p>
@@ -1613,7 +1615,7 @@
           <a:p>
             <a:fld id="{8F1CCE99-546E-42A4-8D69-179D7C9CE33A}" type="datetimeFigureOut">
               <a:rPr lang="en-US" smtClean="0"/>
-              <a:t>12/29/2017</a:t>
+              <a:t>5/2/2018</a:t>
             </a:fld>
             <a:endParaRPr lang="en-US"/>
           </a:p>
@@ -1731,7 +1733,7 @@
           <a:p>
             <a:fld id="{8F1CCE99-546E-42A4-8D69-179D7C9CE33A}" type="datetimeFigureOut">
               <a:rPr lang="en-US" smtClean="0"/>
-              <a:t>12/29/2017</a:t>
+              <a:t>5/2/2018</a:t>
             </a:fld>
             <a:endParaRPr lang="en-US"/>
           </a:p>
@@ -1826,7 +1828,7 @@
           <a:p>
             <a:fld id="{8F1CCE99-546E-42A4-8D69-179D7C9CE33A}" type="datetimeFigureOut">
               <a:rPr lang="en-US" smtClean="0"/>
-              <a:t>12/29/2017</a:t>
+              <a:t>5/2/2018</a:t>
             </a:fld>
             <a:endParaRPr lang="en-US"/>
           </a:p>
@@ -2103,7 +2105,7 @@
           <a:p>
             <a:fld id="{8F1CCE99-546E-42A4-8D69-179D7C9CE33A}" type="datetimeFigureOut">
               <a:rPr lang="en-US" smtClean="0"/>
-              <a:t>12/29/2017</a:t>
+              <a:t>5/2/2018</a:t>
             </a:fld>
             <a:endParaRPr lang="en-US"/>
           </a:p>
@@ -2356,7 +2358,7 @@
           <a:p>
             <a:fld id="{8F1CCE99-546E-42A4-8D69-179D7C9CE33A}" type="datetimeFigureOut">
               <a:rPr lang="en-US" smtClean="0"/>
-              <a:t>12/29/2017</a:t>
+              <a:t>5/2/2018</a:t>
             </a:fld>
             <a:endParaRPr lang="en-US"/>
           </a:p>
@@ -2569,7 +2571,7 @@
           <a:p>
             <a:fld id="{8F1CCE99-546E-42A4-8D69-179D7C9CE33A}" type="datetimeFigureOut">
               <a:rPr lang="en-US" smtClean="0"/>
-              <a:t>12/29/2017</a:t>
+              <a:t>5/2/2018</a:t>
             </a:fld>
             <a:endParaRPr lang="en-US"/>
           </a:p>
@@ -4184,6 +4186,94 @@
 </p:sld>
 </file>
 
+<file path=ppt/slides/slide7.xml><?xml version="1.0" encoding="utf-8"?>
+<p:sld xmlns:a="http://schemas.openxmlformats.org/drawingml/2006/main" xmlns:r="http://schemas.openxmlformats.org/officeDocument/2006/relationships" xmlns:p="http://schemas.openxmlformats.org/presentationml/2006/main">
+  <p:cSld>
+    <p:bg>
+      <p:bgPr>
+        <a:blipFill dpi="0" rotWithShape="1">
+          <a:blip r:embed="rId2">
+            <a:lum/>
+          </a:blip>
+          <a:srcRect/>
+          <a:stretch>
+            <a:fillRect t="-9000" b="-9000"/>
+          </a:stretch>
+        </a:blipFill>
+        <a:effectLst/>
+      </p:bgPr>
+    </p:bg>
+    <p:spTree>
+      <p:nvGrpSpPr>
+        <p:cNvPr id="1" name=""/>
+        <p:cNvGrpSpPr/>
+        <p:nvPr/>
+      </p:nvGrpSpPr>
+      <p:grpSpPr>
+        <a:xfrm>
+          <a:off x="0" y="0"/>
+          <a:ext cx="0" cy="0"/>
+          <a:chOff x="0" y="0"/>
+          <a:chExt cx="0" cy="0"/>
+        </a:xfrm>
+      </p:grpSpPr>
+    </p:spTree>
+    <p:extLst>
+      <p:ext uri="{BB962C8B-B14F-4D97-AF65-F5344CB8AC3E}">
+        <p14:creationId xmlns:p14="http://schemas.microsoft.com/office/powerpoint/2010/main" val="1476717665"/>
+      </p:ext>
+    </p:extLst>
+  </p:cSld>
+  <p:clrMapOvr>
+    <a:masterClrMapping/>
+  </p:clrMapOvr>
+</p:sld>
+</file>
+
+<file path=ppt/slides/slide8.xml><?xml version="1.0" encoding="utf-8"?>
+<p:sld xmlns:a="http://schemas.openxmlformats.org/drawingml/2006/main" xmlns:r="http://schemas.openxmlformats.org/officeDocument/2006/relationships" xmlns:p="http://schemas.openxmlformats.org/presentationml/2006/main">
+  <p:cSld>
+    <p:bg>
+      <p:bgPr>
+        <a:blipFill dpi="0" rotWithShape="1">
+          <a:blip r:embed="rId2">
+            <a:lum/>
+          </a:blip>
+          <a:srcRect/>
+          <a:stretch>
+            <a:fillRect t="-16000"/>
+          </a:stretch>
+        </a:blipFill>
+        <a:effectLst/>
+      </p:bgPr>
+    </p:bg>
+    <p:spTree>
+      <p:nvGrpSpPr>
+        <p:cNvPr id="1" name=""/>
+        <p:cNvGrpSpPr/>
+        <p:nvPr/>
+      </p:nvGrpSpPr>
+      <p:grpSpPr>
+        <a:xfrm>
+          <a:off x="0" y="0"/>
+          <a:ext cx="0" cy="0"/>
+          <a:chOff x="0" y="0"/>
+          <a:chExt cx="0" cy="0"/>
+        </a:xfrm>
+      </p:grpSpPr>
+    </p:spTree>
+    <p:extLst>
+      <p:ext uri="{BB962C8B-B14F-4D97-AF65-F5344CB8AC3E}">
+        <p14:creationId xmlns:p14="http://schemas.microsoft.com/office/powerpoint/2010/main" val="2877465315"/>
+      </p:ext>
+    </p:extLst>
+  </p:cSld>
+  <p:clrMapOvr>
+    <a:masterClrMapping/>
+  </p:clrMapOvr>
+</p:sld>
+</file>
+
 <file path=ppt/theme/theme1.xml><?xml version="1.0" encoding="utf-8"?>
 <a:theme xmlns:a="http://schemas.openxmlformats.org/drawingml/2006/main" name="Office Theme">
   <a:themeElements>

</xml_diff>